<commit_message>
update : ppt uas
</commit_message>
<xml_diff>
--- a/PPT UAS Innama Maesa Putri.pptx
+++ b/PPT UAS Innama Maesa Putri.pptx
@@ -6,7 +6,17 @@
   </p:sldMasterIdLst>
   <p:sldIdLst>
     <p:sldId id="256" r:id="rId2"/>
-    <p:sldId id="257" r:id="rId3"/>
+    <p:sldId id="258" r:id="rId3"/>
+    <p:sldId id="257" r:id="rId4"/>
+    <p:sldId id="259" r:id="rId5"/>
+    <p:sldId id="260" r:id="rId6"/>
+    <p:sldId id="261" r:id="rId7"/>
+    <p:sldId id="262" r:id="rId8"/>
+    <p:sldId id="263" r:id="rId9"/>
+    <p:sldId id="264" r:id="rId10"/>
+    <p:sldId id="265" r:id="rId11"/>
+    <p:sldId id="266" r:id="rId12"/>
+    <p:sldId id="267" r:id="rId13"/>
   </p:sldIdLst>
   <p:sldSz cx="12192000" cy="6858000"/>
   <p:notesSz cx="6858000" cy="9144000"/>
@@ -105,6 +115,11 @@
       </a:defRPr>
     </a:lvl9pPr>
   </p:defaultTextStyle>
+  <p:extLst>
+    <p:ext uri="{EFAFB233-063F-42B5-8137-9DF3F51BA10A}">
+      <p15:sldGuideLst xmlns:p15="http://schemas.microsoft.com/office/powerpoint/2012/main"/>
+    </p:ext>
+  </p:extLst>
 </p:presentation>
 </file>
 
@@ -334,7 +349,7 @@
           <a:p>
             <a:fld id="{11D9BC77-6E59-461A-BE8F-78BB0C41F89F}" type="datetimeFigureOut">
               <a:rPr lang="id-ID" smtClean="0"/>
-              <a:t>13/05/2024</a:t>
+              <a:t>27/05/2024</a:t>
             </a:fld>
             <a:endParaRPr lang="id-ID"/>
           </a:p>
@@ -542,7 +557,7 @@
           <a:p>
             <a:fld id="{11D9BC77-6E59-461A-BE8F-78BB0C41F89F}" type="datetimeFigureOut">
               <a:rPr lang="id-ID" smtClean="0"/>
-              <a:t>13/05/2024</a:t>
+              <a:t>27/05/2024</a:t>
             </a:fld>
             <a:endParaRPr lang="id-ID"/>
           </a:p>
@@ -798,7 +813,7 @@
           <a:p>
             <a:fld id="{11D9BC77-6E59-461A-BE8F-78BB0C41F89F}" type="datetimeFigureOut">
               <a:rPr lang="id-ID" smtClean="0"/>
-              <a:t>13/05/2024</a:t>
+              <a:t>27/05/2024</a:t>
             </a:fld>
             <a:endParaRPr lang="id-ID"/>
           </a:p>
@@ -972,7 +987,7 @@
           <a:p>
             <a:fld id="{11D9BC77-6E59-461A-BE8F-78BB0C41F89F}" type="datetimeFigureOut">
               <a:rPr lang="id-ID" smtClean="0"/>
-              <a:t>13/05/2024</a:t>
+              <a:t>27/05/2024</a:t>
             </a:fld>
             <a:endParaRPr lang="id-ID"/>
           </a:p>
@@ -1315,7 +1330,7 @@
           <a:p>
             <a:fld id="{11D9BC77-6E59-461A-BE8F-78BB0C41F89F}" type="datetimeFigureOut">
               <a:rPr lang="id-ID" smtClean="0"/>
-              <a:t>13/05/2024</a:t>
+              <a:t>27/05/2024</a:t>
             </a:fld>
             <a:endParaRPr lang="id-ID"/>
           </a:p>
@@ -1590,7 +1605,7 @@
           <a:p>
             <a:fld id="{11D9BC77-6E59-461A-BE8F-78BB0C41F89F}" type="datetimeFigureOut">
               <a:rPr lang="id-ID" smtClean="0"/>
-              <a:t>13/05/2024</a:t>
+              <a:t>27/05/2024</a:t>
             </a:fld>
             <a:endParaRPr lang="id-ID"/>
           </a:p>
@@ -1969,7 +1984,7 @@
           <a:p>
             <a:fld id="{11D9BC77-6E59-461A-BE8F-78BB0C41F89F}" type="datetimeFigureOut">
               <a:rPr lang="id-ID" smtClean="0"/>
-              <a:t>13/05/2024</a:t>
+              <a:t>27/05/2024</a:t>
             </a:fld>
             <a:endParaRPr lang="id-ID"/>
           </a:p>
@@ -2087,7 +2102,7 @@
           <a:p>
             <a:fld id="{11D9BC77-6E59-461A-BE8F-78BB0C41F89F}" type="datetimeFigureOut">
               <a:rPr lang="id-ID" smtClean="0"/>
-              <a:t>13/05/2024</a:t>
+              <a:t>27/05/2024</a:t>
             </a:fld>
             <a:endParaRPr lang="id-ID"/>
           </a:p>
@@ -2258,7 +2273,7 @@
           <a:p>
             <a:fld id="{11D9BC77-6E59-461A-BE8F-78BB0C41F89F}" type="datetimeFigureOut">
               <a:rPr lang="id-ID" smtClean="0"/>
-              <a:t>13/05/2024</a:t>
+              <a:t>27/05/2024</a:t>
             </a:fld>
             <a:endParaRPr lang="id-ID"/>
           </a:p>
@@ -2612,7 +2627,7 @@
           <a:p>
             <a:fld id="{11D9BC77-6E59-461A-BE8F-78BB0C41F89F}" type="datetimeFigureOut">
               <a:rPr lang="id-ID" smtClean="0"/>
-              <a:t>13/05/2024</a:t>
+              <a:t>27/05/2024</a:t>
             </a:fld>
             <a:endParaRPr lang="id-ID"/>
           </a:p>
@@ -2994,7 +3009,7 @@
           <a:p>
             <a:fld id="{11D9BC77-6E59-461A-BE8F-78BB0C41F89F}" type="datetimeFigureOut">
               <a:rPr lang="id-ID" smtClean="0"/>
-              <a:t>13/05/2024</a:t>
+              <a:t>27/05/2024</a:t>
             </a:fld>
             <a:endParaRPr lang="id-ID"/>
           </a:p>
@@ -3281,7 +3296,7 @@
           <a:p>
             <a:fld id="{11D9BC77-6E59-461A-BE8F-78BB0C41F89F}" type="datetimeFigureOut">
               <a:rPr lang="id-ID" smtClean="0"/>
-              <a:t>13/05/2024</a:t>
+              <a:t>27/05/2024</a:t>
             </a:fld>
             <a:endParaRPr lang="id-ID"/>
           </a:p>
@@ -3919,6 +3934,243 @@
 </p:sld>
 </file>
 
+<file path=ppt/slides/slide10.xml><?xml version="1.0" encoding="utf-8"?>
+<p:sld xmlns:a="http://schemas.openxmlformats.org/drawingml/2006/main" xmlns:r="http://schemas.openxmlformats.org/officeDocument/2006/relationships" xmlns:p="http://schemas.openxmlformats.org/presentationml/2006/main">
+  <p:cSld>
+    <p:spTree>
+      <p:nvGrpSpPr>
+        <p:cNvPr id="1" name=""/>
+        <p:cNvGrpSpPr/>
+        <p:nvPr/>
+      </p:nvGrpSpPr>
+      <p:grpSpPr>
+        <a:xfrm>
+          <a:off x="0" y="0"/>
+          <a:ext cx="0" cy="0"/>
+          <a:chOff x="0" y="0"/>
+          <a:chExt cx="0" cy="0"/>
+        </a:xfrm>
+      </p:grpSpPr>
+      <p:sp>
+        <p:nvSpPr>
+          <p:cNvPr id="2" name="Title 1"/>
+          <p:cNvSpPr>
+            <a:spLocks noGrp="1"/>
+          </p:cNvSpPr>
+          <p:nvPr>
+            <p:ph type="title"/>
+          </p:nvPr>
+        </p:nvSpPr>
+        <p:spPr/>
+        <p:txBody>
+          <a:bodyPr/>
+          <a:lstStyle/>
+          <a:p>
+            <a:r>
+              <a:rPr lang="en-US" dirty="0" smtClean="0"/>
+              <a:t>Copy file</a:t>
+            </a:r>
+            <a:endParaRPr lang="id-ID" dirty="0"/>
+          </a:p>
+        </p:txBody>
+      </p:sp>
+      <p:pic>
+        <p:nvPicPr>
+          <p:cNvPr id="4" name="Content Placeholder 3"/>
+          <p:cNvPicPr>
+            <a:picLocks noGrp="1" noChangeAspect="1"/>
+          </p:cNvPicPr>
+          <p:nvPr>
+            <p:ph idx="1"/>
+          </p:nvPr>
+        </p:nvPicPr>
+        <p:blipFill>
+          <a:blip r:embed="rId2"/>
+          <a:stretch>
+            <a:fillRect/>
+          </a:stretch>
+        </p:blipFill>
+        <p:spPr>
+          <a:xfrm>
+            <a:off x="3373061" y="1999104"/>
+            <a:ext cx="5506837" cy="4173273"/>
+          </a:xfrm>
+          <a:prstGeom prst="rect">
+            <a:avLst/>
+          </a:prstGeom>
+        </p:spPr>
+      </p:pic>
+    </p:spTree>
+    <p:extLst>
+      <p:ext uri="{BB962C8B-B14F-4D97-AF65-F5344CB8AC3E}">
+        <p14:creationId xmlns:p14="http://schemas.microsoft.com/office/powerpoint/2010/main" val="279439245"/>
+      </p:ext>
+    </p:extLst>
+  </p:cSld>
+  <p:clrMapOvr>
+    <a:masterClrMapping/>
+  </p:clrMapOvr>
+</p:sld>
+</file>
+
+<file path=ppt/slides/slide11.xml><?xml version="1.0" encoding="utf-8"?>
+<p:sld xmlns:a="http://schemas.openxmlformats.org/drawingml/2006/main" xmlns:r="http://schemas.openxmlformats.org/officeDocument/2006/relationships" xmlns:p="http://schemas.openxmlformats.org/presentationml/2006/main">
+  <p:cSld>
+    <p:spTree>
+      <p:nvGrpSpPr>
+        <p:cNvPr id="1" name=""/>
+        <p:cNvGrpSpPr/>
+        <p:nvPr/>
+      </p:nvGrpSpPr>
+      <p:grpSpPr>
+        <a:xfrm>
+          <a:off x="0" y="0"/>
+          <a:ext cx="0" cy="0"/>
+          <a:chOff x="0" y="0"/>
+          <a:chExt cx="0" cy="0"/>
+        </a:xfrm>
+      </p:grpSpPr>
+      <p:sp>
+        <p:nvSpPr>
+          <p:cNvPr id="2" name="Title 1"/>
+          <p:cNvSpPr>
+            <a:spLocks noGrp="1"/>
+          </p:cNvSpPr>
+          <p:nvPr>
+            <p:ph type="title"/>
+          </p:nvPr>
+        </p:nvSpPr>
+        <p:spPr/>
+        <p:txBody>
+          <a:bodyPr/>
+          <a:lstStyle/>
+          <a:p>
+            <a:r>
+              <a:rPr lang="en-US" dirty="0" smtClean="0"/>
+              <a:t>Move file</a:t>
+            </a:r>
+            <a:endParaRPr lang="id-ID" dirty="0"/>
+          </a:p>
+        </p:txBody>
+      </p:sp>
+      <p:pic>
+        <p:nvPicPr>
+          <p:cNvPr id="4" name="Content Placeholder 3"/>
+          <p:cNvPicPr>
+            <a:picLocks noGrp="1" noChangeAspect="1"/>
+          </p:cNvPicPr>
+          <p:nvPr>
+            <p:ph idx="1"/>
+          </p:nvPr>
+        </p:nvPicPr>
+        <p:blipFill>
+          <a:blip r:embed="rId2"/>
+          <a:stretch>
+            <a:fillRect/>
+          </a:stretch>
+        </p:blipFill>
+        <p:spPr>
+          <a:xfrm>
+            <a:off x="3674472" y="2113681"/>
+            <a:ext cx="4904016" cy="3820571"/>
+          </a:xfrm>
+          <a:prstGeom prst="rect">
+            <a:avLst/>
+          </a:prstGeom>
+        </p:spPr>
+      </p:pic>
+    </p:spTree>
+    <p:extLst>
+      <p:ext uri="{BB962C8B-B14F-4D97-AF65-F5344CB8AC3E}">
+        <p14:creationId xmlns:p14="http://schemas.microsoft.com/office/powerpoint/2010/main" val="1904802582"/>
+      </p:ext>
+    </p:extLst>
+  </p:cSld>
+  <p:clrMapOvr>
+    <a:masterClrMapping/>
+  </p:clrMapOvr>
+</p:sld>
+</file>
+
+<file path=ppt/slides/slide12.xml><?xml version="1.0" encoding="utf-8"?>
+<p:sld xmlns:a="http://schemas.openxmlformats.org/drawingml/2006/main" xmlns:r="http://schemas.openxmlformats.org/officeDocument/2006/relationships" xmlns:p="http://schemas.openxmlformats.org/presentationml/2006/main">
+  <p:cSld>
+    <p:spTree>
+      <p:nvGrpSpPr>
+        <p:cNvPr id="1" name=""/>
+        <p:cNvGrpSpPr/>
+        <p:nvPr/>
+      </p:nvGrpSpPr>
+      <p:grpSpPr>
+        <a:xfrm>
+          <a:off x="0" y="0"/>
+          <a:ext cx="0" cy="0"/>
+          <a:chOff x="0" y="0"/>
+          <a:chExt cx="0" cy="0"/>
+        </a:xfrm>
+      </p:grpSpPr>
+      <p:sp>
+        <p:nvSpPr>
+          <p:cNvPr id="2" name="Title 1"/>
+          <p:cNvSpPr>
+            <a:spLocks noGrp="1"/>
+          </p:cNvSpPr>
+          <p:nvPr>
+            <p:ph type="title"/>
+          </p:nvPr>
+        </p:nvSpPr>
+        <p:spPr/>
+        <p:txBody>
+          <a:bodyPr/>
+          <a:lstStyle/>
+          <a:p>
+            <a:r>
+              <a:rPr lang="en-US" dirty="0" smtClean="0"/>
+              <a:t>Read file</a:t>
+            </a:r>
+            <a:endParaRPr lang="id-ID" dirty="0"/>
+          </a:p>
+        </p:txBody>
+      </p:sp>
+      <p:pic>
+        <p:nvPicPr>
+          <p:cNvPr id="4" name="Content Placeholder 3"/>
+          <p:cNvPicPr>
+            <a:picLocks noGrp="1" noChangeAspect="1"/>
+          </p:cNvPicPr>
+          <p:nvPr>
+            <p:ph idx="1"/>
+          </p:nvPr>
+        </p:nvPicPr>
+        <p:blipFill>
+          <a:blip r:embed="rId2"/>
+          <a:stretch>
+            <a:fillRect/>
+          </a:stretch>
+        </p:blipFill>
+        <p:spPr>
+          <a:xfrm>
+            <a:off x="4388558" y="1846263"/>
+            <a:ext cx="3475209" cy="4022725"/>
+          </a:xfrm>
+          <a:prstGeom prst="rect">
+            <a:avLst/>
+          </a:prstGeom>
+        </p:spPr>
+      </p:pic>
+    </p:spTree>
+    <p:extLst>
+      <p:ext uri="{BB962C8B-B14F-4D97-AF65-F5344CB8AC3E}">
+        <p14:creationId xmlns:p14="http://schemas.microsoft.com/office/powerpoint/2010/main" val="1696906133"/>
+      </p:ext>
+    </p:extLst>
+  </p:cSld>
+  <p:clrMapOvr>
+    <a:masterClrMapping/>
+  </p:clrMapOvr>
+</p:sld>
+</file>
+
 <file path=ppt/slides/slide2.xml><?xml version="1.0" encoding="utf-8"?>
 <p:sld xmlns:a="http://schemas.openxmlformats.org/drawingml/2006/main" xmlns:r="http://schemas.openxmlformats.org/officeDocument/2006/relationships" xmlns:p="http://schemas.openxmlformats.org/presentationml/2006/main">
   <p:cSld>
@@ -3946,6 +4198,137 @@
             <p:ph type="title"/>
           </p:nvPr>
         </p:nvSpPr>
+        <p:spPr/>
+        <p:txBody>
+          <a:bodyPr/>
+          <a:lstStyle/>
+          <a:p>
+            <a:r>
+              <a:rPr lang="en-US" dirty="0" err="1" smtClean="0"/>
+              <a:t>Pemrograman</a:t>
+            </a:r>
+            <a:r>
+              <a:rPr lang="en-US" dirty="0" smtClean="0"/>
+              <a:t> Shell</a:t>
+            </a:r>
+            <a:endParaRPr lang="id-ID" dirty="0"/>
+          </a:p>
+        </p:txBody>
+      </p:sp>
+      <p:sp>
+        <p:nvSpPr>
+          <p:cNvPr id="3" name="Content Placeholder 2"/>
+          <p:cNvSpPr>
+            <a:spLocks noGrp="1"/>
+          </p:cNvSpPr>
+          <p:nvPr>
+            <p:ph idx="1"/>
+          </p:nvPr>
+        </p:nvSpPr>
+        <p:spPr/>
+        <p:txBody>
+          <a:bodyPr/>
+          <a:lstStyle/>
+          <a:p>
+            <a:r>
+              <a:rPr lang="id-ID" dirty="0"/>
+              <a:t>Pemrograman shell adalah proses menulis skrip atau program menggunakan bahasa shell untuk mengotomatisasi tugas di sistem operasi. Shell adalah antarmuka perintah yang memungkinkan pengguna untuk berinteraksi dengan sistem operasi. Contoh shell yang populer termasuk Bash (Bourne Again Shell), Zsh (Z Shell), dan Ksh (Korn Shell</a:t>
+            </a:r>
+            <a:r>
+              <a:rPr lang="id-ID" dirty="0" smtClean="0"/>
+              <a:t>).</a:t>
+            </a:r>
+            <a:endParaRPr lang="en-US" dirty="0" smtClean="0"/>
+          </a:p>
+          <a:p>
+            <a:endParaRPr lang="en-US" dirty="0"/>
+          </a:p>
+          <a:p>
+            <a:r>
+              <a:rPr lang="en-US" dirty="0" smtClean="0"/>
+              <a:t>K</a:t>
+            </a:r>
+            <a:r>
+              <a:rPr lang="id-ID" dirty="0" smtClean="0"/>
+              <a:t>euntungan </a:t>
+            </a:r>
+            <a:r>
+              <a:rPr lang="id-ID" dirty="0"/>
+              <a:t>Pemrograman Shell</a:t>
+            </a:r>
+          </a:p>
+          <a:p>
+            <a:pPr marL="457200" indent="-457200">
+              <a:buFont typeface="+mj-lt"/>
+              <a:buAutoNum type="arabicPeriod"/>
+            </a:pPr>
+            <a:r>
+              <a:rPr lang="id-ID" dirty="0"/>
+              <a:t>Otomasi: Memungkinkan otomatisasi tugas-tugas rutin dan repetitif.</a:t>
+            </a:r>
+          </a:p>
+          <a:p>
+            <a:pPr marL="457200" indent="-457200">
+              <a:buFont typeface="+mj-lt"/>
+              <a:buAutoNum type="arabicPeriod"/>
+            </a:pPr>
+            <a:r>
+              <a:rPr lang="id-ID" dirty="0"/>
+              <a:t>Efisiensi: Mengurangi kesalahan manusia dan meningkatkan efisiensi dengan mengotomatisasi proses.</a:t>
+            </a:r>
+          </a:p>
+          <a:p>
+            <a:pPr marL="457200" indent="-457200">
+              <a:buFont typeface="+mj-lt"/>
+              <a:buAutoNum type="arabicPeriod"/>
+            </a:pPr>
+            <a:r>
+              <a:rPr lang="id-ID" dirty="0"/>
+              <a:t>Integrasi: Dapat dengan mudah berinteraksi dengan berbagai program dan utilitas di sistem operasi.</a:t>
+            </a:r>
+          </a:p>
+        </p:txBody>
+      </p:sp>
+    </p:spTree>
+    <p:extLst>
+      <p:ext uri="{BB962C8B-B14F-4D97-AF65-F5344CB8AC3E}">
+        <p14:creationId xmlns:p14="http://schemas.microsoft.com/office/powerpoint/2010/main" val="2345258711"/>
+      </p:ext>
+    </p:extLst>
+  </p:cSld>
+  <p:clrMapOvr>
+    <a:masterClrMapping/>
+  </p:clrMapOvr>
+</p:sld>
+</file>
+
+<file path=ppt/slides/slide3.xml><?xml version="1.0" encoding="utf-8"?>
+<p:sld xmlns:a="http://schemas.openxmlformats.org/drawingml/2006/main" xmlns:r="http://schemas.openxmlformats.org/officeDocument/2006/relationships" xmlns:p="http://schemas.openxmlformats.org/presentationml/2006/main">
+  <p:cSld>
+    <p:spTree>
+      <p:nvGrpSpPr>
+        <p:cNvPr id="1" name=""/>
+        <p:cNvGrpSpPr/>
+        <p:nvPr/>
+      </p:nvGrpSpPr>
+      <p:grpSpPr>
+        <a:xfrm>
+          <a:off x="0" y="0"/>
+          <a:ext cx="0" cy="0"/>
+          <a:chOff x="0" y="0"/>
+          <a:chExt cx="0" cy="0"/>
+        </a:xfrm>
+      </p:grpSpPr>
+      <p:sp>
+        <p:nvSpPr>
+          <p:cNvPr id="2" name="Title 1"/>
+          <p:cNvSpPr>
+            <a:spLocks noGrp="1"/>
+          </p:cNvSpPr>
+          <p:nvPr>
+            <p:ph type="title"/>
+          </p:nvPr>
+        </p:nvSpPr>
         <p:spPr>
           <a:xfrm>
             <a:off x="1071154" y="286603"/>
@@ -3981,14 +4364,14 @@
           <p:nvPr>
             <p:extLst>
               <p:ext uri="{D42A27DB-BD31-4B8C-83A1-F6EECF244321}">
-                <p14:modId xmlns:p14="http://schemas.microsoft.com/office/powerpoint/2010/main" val="397291306"/>
+                <p14:modId xmlns:p14="http://schemas.microsoft.com/office/powerpoint/2010/main" val="3058342793"/>
               </p:ext>
             </p:extLst>
           </p:nvPr>
         </p:nvGraphicFramePr>
         <p:xfrm>
           <a:off x="1071154" y="1973700"/>
-          <a:ext cx="10084527" cy="1483360"/>
+          <a:ext cx="10084527" cy="3708400"/>
         </p:xfrm>
         <a:graphic>
           <a:graphicData uri="http://schemas.openxmlformats.org/drawingml/2006/table">
@@ -4162,6 +4545,18 @@
                         <a:rPr lang="en-US" dirty="0" err="1" smtClean="0"/>
                         <a:t>direktori</a:t>
                       </a:r>
+                      <a:r>
+                        <a:rPr lang="en-US" dirty="0" smtClean="0"/>
+                        <a:t> </a:t>
+                      </a:r>
+                      <a:r>
+                        <a:rPr lang="en-US" dirty="0" err="1" smtClean="0"/>
+                        <a:t>dan</a:t>
+                      </a:r>
+                      <a:r>
+                        <a:rPr lang="en-US" dirty="0" smtClean="0"/>
+                        <a:t> file</a:t>
+                      </a:r>
                       <a:endParaRPr lang="id-ID" dirty="0"/>
                     </a:p>
                   </a:txBody>
@@ -4191,6 +4586,18 @@
                       <a:r>
                         <a:rPr lang="en-US" baseline="0" dirty="0" err="1" smtClean="0"/>
                         <a:t>direktori</a:t>
+                      </a:r>
+                      <a:r>
+                        <a:rPr lang="en-US" baseline="0" dirty="0" smtClean="0"/>
+                        <a:t> </a:t>
+                      </a:r>
+                      <a:r>
+                        <a:rPr lang="en-US" baseline="0" dirty="0" err="1" smtClean="0"/>
+                        <a:t>dan</a:t>
+                      </a:r>
+                      <a:r>
+                        <a:rPr lang="en-US" baseline="0" dirty="0" smtClean="0"/>
+                        <a:t> file</a:t>
                       </a:r>
                       <a:endParaRPr lang="id-ID" dirty="0"/>
                     </a:p>
@@ -4225,16 +4632,16 @@
                     <a:lstStyle/>
                     <a:p>
                       <a:r>
-                        <a:rPr lang="en-US" dirty="0" err="1" smtClean="0"/>
-                        <a:t>Lihat</a:t>
-                      </a:r>
-                      <a:r>
                         <a:rPr lang="en-US" dirty="0" smtClean="0"/>
+                        <a:t>Download repository</a:t>
+                      </a:r>
+                      <a:r>
+                        <a:rPr lang="en-US" baseline="0" dirty="0" smtClean="0"/>
                         <a:t> </a:t>
                       </a:r>
                       <a:r>
-                        <a:rPr lang="en-US" dirty="0" err="1" smtClean="0"/>
-                        <a:t>direktori</a:t>
+                        <a:rPr lang="en-US" baseline="0" dirty="0" err="1" smtClean="0"/>
+                        <a:t>github</a:t>
                       </a:r>
                       <a:endParaRPr lang="id-ID" dirty="0"/>
                     </a:p>
@@ -4247,24 +4654,16 @@
                     <a:lstStyle/>
                     <a:p>
                       <a:r>
-                        <a:rPr lang="en-US" dirty="0" err="1" smtClean="0"/>
-                        <a:t>Melihat</a:t>
-                      </a:r>
-                      <a:r>
                         <a:rPr lang="en-US" dirty="0" smtClean="0"/>
-                        <a:t> </a:t>
-                      </a:r>
-                      <a:r>
-                        <a:rPr lang="en-US" dirty="0" err="1" smtClean="0"/>
-                        <a:t>daftar</a:t>
-                      </a:r>
-                      <a:r>
-                        <a:rPr lang="en-US" dirty="0" smtClean="0"/>
-                        <a:t> file </a:t>
-                      </a:r>
-                      <a:r>
-                        <a:rPr lang="en-US" dirty="0" err="1" smtClean="0"/>
-                        <a:t>dalam</a:t>
+                        <a:t>Clone</a:t>
+                      </a:r>
+                      <a:r>
+                        <a:rPr lang="en-US" baseline="0" dirty="0" smtClean="0"/>
+                        <a:t> repository </a:t>
+                      </a:r>
+                      <a:r>
+                        <a:rPr lang="en-US" baseline="0" dirty="0" err="1" smtClean="0"/>
+                        <a:t>github</a:t>
                       </a:r>
                       <a:r>
                         <a:rPr lang="en-US" baseline="0" dirty="0" smtClean="0"/>
@@ -4272,7 +4671,23 @@
                       </a:r>
                       <a:r>
                         <a:rPr lang="en-US" baseline="0" dirty="0" err="1" smtClean="0"/>
-                        <a:t>direktori</a:t>
+                        <a:t>untuk</a:t>
+                      </a:r>
+                      <a:r>
+                        <a:rPr lang="en-US" baseline="0" dirty="0" smtClean="0"/>
+                        <a:t> </a:t>
+                      </a:r>
+                      <a:r>
+                        <a:rPr lang="en-US" baseline="0" dirty="0" err="1" smtClean="0"/>
+                        <a:t>ditempatkan</a:t>
+                      </a:r>
+                      <a:r>
+                        <a:rPr lang="en-US" baseline="0" dirty="0" smtClean="0"/>
+                        <a:t> di </a:t>
+                      </a:r>
+                      <a:r>
+                        <a:rPr lang="en-US" baseline="0" dirty="0" err="1" smtClean="0"/>
+                        <a:t>lokal</a:t>
                       </a:r>
                       <a:endParaRPr lang="id-ID" dirty="0"/>
                     </a:p>
@@ -4285,6 +4700,486 @@
                   </a:ext>
                 </a:extLst>
               </a:tr>
+              <a:tr h="370840">
+                <a:tc>
+                  <a:txBody>
+                    <a:bodyPr/>
+                    <a:lstStyle/>
+                    <a:p>
+                      <a:pPr algn="ctr"/>
+                      <a:r>
+                        <a:rPr lang="en-US" dirty="0" smtClean="0"/>
+                        <a:t>4.</a:t>
+                      </a:r>
+                      <a:endParaRPr lang="id-ID" dirty="0"/>
+                    </a:p>
+                  </a:txBody>
+                  <a:tcPr/>
+                </a:tc>
+                <a:tc>
+                  <a:txBody>
+                    <a:bodyPr/>
+                    <a:lstStyle/>
+                    <a:p>
+                      <a:r>
+                        <a:rPr lang="en-US" dirty="0" err="1" smtClean="0"/>
+                        <a:t>Cek</a:t>
+                      </a:r>
+                      <a:r>
+                        <a:rPr lang="en-US" dirty="0" smtClean="0"/>
+                        <a:t> </a:t>
+                      </a:r>
+                      <a:r>
+                        <a:rPr lang="en-US" dirty="0" err="1" smtClean="0"/>
+                        <a:t>konektivitas</a:t>
+                      </a:r>
+                      <a:endParaRPr lang="id-ID" dirty="0"/>
+                    </a:p>
+                  </a:txBody>
+                  <a:tcPr/>
+                </a:tc>
+                <a:tc>
+                  <a:txBody>
+                    <a:bodyPr/>
+                    <a:lstStyle/>
+                    <a:p>
+                      <a:r>
+                        <a:rPr lang="en-US" dirty="0" err="1" smtClean="0"/>
+                        <a:t>Memeriksa</a:t>
+                      </a:r>
+                      <a:r>
+                        <a:rPr lang="en-US" dirty="0" smtClean="0"/>
+                        <a:t> </a:t>
+                      </a:r>
+                      <a:r>
+                        <a:rPr lang="en-US" dirty="0" err="1" smtClean="0"/>
+                        <a:t>koneksi</a:t>
+                      </a:r>
+                      <a:r>
+                        <a:rPr lang="en-US" dirty="0" smtClean="0"/>
+                        <a:t> </a:t>
+                      </a:r>
+                      <a:r>
+                        <a:rPr lang="en-US" dirty="0" err="1" smtClean="0"/>
+                        <a:t>ke</a:t>
+                      </a:r>
+                      <a:r>
+                        <a:rPr lang="en-US" dirty="0" smtClean="0"/>
+                        <a:t> </a:t>
+                      </a:r>
+                      <a:r>
+                        <a:rPr lang="en-US" dirty="0" err="1" smtClean="0"/>
+                        <a:t>alamat</a:t>
+                      </a:r>
+                      <a:r>
+                        <a:rPr lang="en-US" dirty="0" smtClean="0"/>
+                        <a:t> </a:t>
+                      </a:r>
+                      <a:r>
+                        <a:rPr lang="en-US" dirty="0" err="1" smtClean="0"/>
+                        <a:t>url</a:t>
+                      </a:r>
+                      <a:r>
+                        <a:rPr lang="en-US" dirty="0" smtClean="0"/>
+                        <a:t> </a:t>
+                      </a:r>
+                      <a:r>
+                        <a:rPr lang="en-US" dirty="0" err="1" smtClean="0"/>
+                        <a:t>atau</a:t>
+                      </a:r>
+                      <a:r>
+                        <a:rPr lang="en-US" dirty="0" smtClean="0"/>
+                        <a:t> IP </a:t>
+                      </a:r>
+                      <a:r>
+                        <a:rPr lang="en-US" dirty="0" err="1" smtClean="0"/>
+                        <a:t>komputer</a:t>
+                      </a:r>
+                      <a:endParaRPr lang="id-ID" dirty="0"/>
+                    </a:p>
+                  </a:txBody>
+                  <a:tcPr/>
+                </a:tc>
+                <a:extLst>
+                  <a:ext uri="{0D108BD9-81ED-4DB2-BD59-A6C34878D82A}">
+                    <a16:rowId xmlns:a16="http://schemas.microsoft.com/office/drawing/2014/main" val="1783211412"/>
+                  </a:ext>
+                </a:extLst>
+              </a:tr>
+              <a:tr h="370840">
+                <a:tc>
+                  <a:txBody>
+                    <a:bodyPr/>
+                    <a:lstStyle/>
+                    <a:p>
+                      <a:pPr algn="ctr"/>
+                      <a:r>
+                        <a:rPr lang="en-US" dirty="0" smtClean="0"/>
+                        <a:t>5.</a:t>
+                      </a:r>
+                      <a:endParaRPr lang="id-ID" dirty="0"/>
+                    </a:p>
+                  </a:txBody>
+                  <a:tcPr/>
+                </a:tc>
+                <a:tc>
+                  <a:txBody>
+                    <a:bodyPr/>
+                    <a:lstStyle/>
+                    <a:p>
+                      <a:r>
+                        <a:rPr lang="en-US" dirty="0" err="1" smtClean="0"/>
+                        <a:t>Hapus</a:t>
+                      </a:r>
+                      <a:r>
+                        <a:rPr lang="en-US" dirty="0" smtClean="0"/>
+                        <a:t> repository </a:t>
+                      </a:r>
+                      <a:r>
+                        <a:rPr lang="en-US" dirty="0" err="1" smtClean="0"/>
+                        <a:t>github</a:t>
+                      </a:r>
+                      <a:endParaRPr lang="id-ID" dirty="0"/>
+                    </a:p>
+                  </a:txBody>
+                  <a:tcPr/>
+                </a:tc>
+                <a:tc>
+                  <a:txBody>
+                    <a:bodyPr/>
+                    <a:lstStyle/>
+                    <a:p>
+                      <a:r>
+                        <a:rPr lang="en-US" dirty="0" err="1" smtClean="0"/>
+                        <a:t>Menghapus</a:t>
+                      </a:r>
+                      <a:r>
+                        <a:rPr lang="en-US" dirty="0" smtClean="0"/>
+                        <a:t> repository </a:t>
+                      </a:r>
+                      <a:r>
+                        <a:rPr lang="en-US" dirty="0" err="1" smtClean="0"/>
+                        <a:t>lokal</a:t>
+                      </a:r>
+                      <a:endParaRPr lang="id-ID" dirty="0"/>
+                    </a:p>
+                  </a:txBody>
+                  <a:tcPr/>
+                </a:tc>
+                <a:extLst>
+                  <a:ext uri="{0D108BD9-81ED-4DB2-BD59-A6C34878D82A}">
+                    <a16:rowId xmlns:a16="http://schemas.microsoft.com/office/drawing/2014/main" val="2232625589"/>
+                  </a:ext>
+                </a:extLst>
+              </a:tr>
+              <a:tr h="370840">
+                <a:tc>
+                  <a:txBody>
+                    <a:bodyPr/>
+                    <a:lstStyle/>
+                    <a:p>
+                      <a:pPr algn="ctr"/>
+                      <a:r>
+                        <a:rPr lang="en-US" dirty="0" smtClean="0"/>
+                        <a:t>6.</a:t>
+                      </a:r>
+                      <a:endParaRPr lang="id-ID" dirty="0"/>
+                    </a:p>
+                  </a:txBody>
+                  <a:tcPr/>
+                </a:tc>
+                <a:tc>
+                  <a:txBody>
+                    <a:bodyPr/>
+                    <a:lstStyle/>
+                    <a:p>
+                      <a:r>
+                        <a:rPr lang="en-US" dirty="0" err="1" smtClean="0"/>
+                        <a:t>Hapus</a:t>
+                      </a:r>
+                      <a:r>
+                        <a:rPr lang="en-US" dirty="0" smtClean="0"/>
+                        <a:t> folder</a:t>
+                      </a:r>
+                      <a:endParaRPr lang="id-ID" dirty="0"/>
+                    </a:p>
+                  </a:txBody>
+                  <a:tcPr/>
+                </a:tc>
+                <a:tc>
+                  <a:txBody>
+                    <a:bodyPr/>
+                    <a:lstStyle/>
+                    <a:p>
+                      <a:r>
+                        <a:rPr lang="en-US" dirty="0" err="1" smtClean="0"/>
+                        <a:t>Menghapus</a:t>
+                      </a:r>
+                      <a:r>
+                        <a:rPr lang="en-US" dirty="0" smtClean="0"/>
+                        <a:t> folder </a:t>
+                      </a:r>
+                      <a:r>
+                        <a:rPr lang="en-US" dirty="0" err="1" smtClean="0"/>
+                        <a:t>atau</a:t>
+                      </a:r>
+                      <a:r>
+                        <a:rPr lang="en-US" dirty="0" smtClean="0"/>
+                        <a:t> </a:t>
+                      </a:r>
+                      <a:r>
+                        <a:rPr lang="en-US" dirty="0" err="1" smtClean="0"/>
+                        <a:t>direktori</a:t>
+                      </a:r>
+                      <a:endParaRPr lang="id-ID" dirty="0"/>
+                    </a:p>
+                  </a:txBody>
+                  <a:tcPr/>
+                </a:tc>
+                <a:extLst>
+                  <a:ext uri="{0D108BD9-81ED-4DB2-BD59-A6C34878D82A}">
+                    <a16:rowId xmlns:a16="http://schemas.microsoft.com/office/drawing/2014/main" val="2129150692"/>
+                  </a:ext>
+                </a:extLst>
+              </a:tr>
+              <a:tr h="370840">
+                <a:tc>
+                  <a:txBody>
+                    <a:bodyPr/>
+                    <a:lstStyle/>
+                    <a:p>
+                      <a:pPr algn="ctr"/>
+                      <a:r>
+                        <a:rPr lang="en-US" dirty="0" smtClean="0"/>
+                        <a:t>7.</a:t>
+                      </a:r>
+                      <a:endParaRPr lang="id-ID" dirty="0"/>
+                    </a:p>
+                  </a:txBody>
+                  <a:tcPr/>
+                </a:tc>
+                <a:tc>
+                  <a:txBody>
+                    <a:bodyPr/>
+                    <a:lstStyle/>
+                    <a:p>
+                      <a:r>
+                        <a:rPr lang="en-US" dirty="0" smtClean="0"/>
+                        <a:t>Copy file</a:t>
+                      </a:r>
+                      <a:endParaRPr lang="id-ID" dirty="0"/>
+                    </a:p>
+                  </a:txBody>
+                  <a:tcPr/>
+                </a:tc>
+                <a:tc>
+                  <a:txBody>
+                    <a:bodyPr/>
+                    <a:lstStyle/>
+                    <a:p>
+                      <a:r>
+                        <a:rPr lang="en-US" dirty="0" err="1" smtClean="0"/>
+                        <a:t>Menyalin</a:t>
+                      </a:r>
+                      <a:r>
+                        <a:rPr lang="en-US" dirty="0" smtClean="0"/>
+                        <a:t> file </a:t>
+                      </a:r>
+                      <a:r>
+                        <a:rPr lang="en-US" dirty="0" err="1" smtClean="0"/>
+                        <a:t>kemudian</a:t>
+                      </a:r>
+                      <a:r>
+                        <a:rPr lang="en-US" dirty="0" smtClean="0"/>
+                        <a:t> </a:t>
+                      </a:r>
+                      <a:r>
+                        <a:rPr lang="en-US" dirty="0" err="1" smtClean="0"/>
+                        <a:t>menentukan</a:t>
+                      </a:r>
+                      <a:r>
+                        <a:rPr lang="en-US" dirty="0" smtClean="0"/>
+                        <a:t> </a:t>
+                      </a:r>
+                      <a:r>
+                        <a:rPr lang="en-US" dirty="0" err="1" smtClean="0"/>
+                        <a:t>direktori</a:t>
+                      </a:r>
+                      <a:r>
+                        <a:rPr lang="en-US" dirty="0" smtClean="0"/>
+                        <a:t> </a:t>
+                      </a:r>
+                      <a:r>
+                        <a:rPr lang="en-US" dirty="0" err="1" smtClean="0"/>
+                        <a:t>tujuan</a:t>
+                      </a:r>
+                      <a:endParaRPr lang="id-ID" dirty="0"/>
+                    </a:p>
+                  </a:txBody>
+                  <a:tcPr/>
+                </a:tc>
+                <a:extLst>
+                  <a:ext uri="{0D108BD9-81ED-4DB2-BD59-A6C34878D82A}">
+                    <a16:rowId xmlns:a16="http://schemas.microsoft.com/office/drawing/2014/main" val="726161394"/>
+                  </a:ext>
+                </a:extLst>
+              </a:tr>
+              <a:tr h="370840">
+                <a:tc>
+                  <a:txBody>
+                    <a:bodyPr/>
+                    <a:lstStyle/>
+                    <a:p>
+                      <a:pPr algn="ctr"/>
+                      <a:r>
+                        <a:rPr lang="en-US" dirty="0" smtClean="0"/>
+                        <a:t>8.</a:t>
+                      </a:r>
+                      <a:endParaRPr lang="id-ID" dirty="0"/>
+                    </a:p>
+                  </a:txBody>
+                  <a:tcPr/>
+                </a:tc>
+                <a:tc>
+                  <a:txBody>
+                    <a:bodyPr/>
+                    <a:lstStyle/>
+                    <a:p>
+                      <a:r>
+                        <a:rPr lang="en-US" dirty="0" smtClean="0"/>
+                        <a:t>Move file</a:t>
+                      </a:r>
+                      <a:endParaRPr lang="id-ID" dirty="0"/>
+                    </a:p>
+                  </a:txBody>
+                  <a:tcPr/>
+                </a:tc>
+                <a:tc>
+                  <a:txBody>
+                    <a:bodyPr/>
+                    <a:lstStyle/>
+                    <a:p>
+                      <a:r>
+                        <a:rPr lang="en-US" dirty="0" err="1" smtClean="0"/>
+                        <a:t>Memindah</a:t>
+                      </a:r>
+                      <a:r>
+                        <a:rPr lang="en-US" dirty="0" smtClean="0"/>
+                        <a:t> file</a:t>
+                      </a:r>
+                      <a:r>
+                        <a:rPr lang="en-US" baseline="0" dirty="0" smtClean="0"/>
+                        <a:t> </a:t>
+                      </a:r>
+                      <a:r>
+                        <a:rPr lang="en-US" baseline="0" dirty="0" err="1" smtClean="0"/>
+                        <a:t>kemudian</a:t>
+                      </a:r>
+                      <a:r>
+                        <a:rPr lang="en-US" baseline="0" dirty="0" smtClean="0"/>
+                        <a:t> </a:t>
+                      </a:r>
+                      <a:r>
+                        <a:rPr lang="en-US" baseline="0" dirty="0" err="1" smtClean="0"/>
+                        <a:t>menentukan</a:t>
+                      </a:r>
+                      <a:r>
+                        <a:rPr lang="en-US" baseline="0" dirty="0" smtClean="0"/>
+                        <a:t> </a:t>
+                      </a:r>
+                      <a:r>
+                        <a:rPr lang="en-US" baseline="0" dirty="0" err="1" smtClean="0"/>
+                        <a:t>direktori</a:t>
+                      </a:r>
+                      <a:r>
+                        <a:rPr lang="en-US" baseline="0" dirty="0" smtClean="0"/>
+                        <a:t> </a:t>
+                      </a:r>
+                      <a:r>
+                        <a:rPr lang="en-US" baseline="0" dirty="0" err="1" smtClean="0"/>
+                        <a:t>tujuan</a:t>
+                      </a:r>
+                      <a:endParaRPr lang="id-ID" dirty="0"/>
+                    </a:p>
+                  </a:txBody>
+                  <a:tcPr/>
+                </a:tc>
+                <a:extLst>
+                  <a:ext uri="{0D108BD9-81ED-4DB2-BD59-A6C34878D82A}">
+                    <a16:rowId xmlns:a16="http://schemas.microsoft.com/office/drawing/2014/main" val="3181688515"/>
+                  </a:ext>
+                </a:extLst>
+              </a:tr>
+              <a:tr h="370840">
+                <a:tc>
+                  <a:txBody>
+                    <a:bodyPr/>
+                    <a:lstStyle/>
+                    <a:p>
+                      <a:pPr algn="ctr"/>
+                      <a:r>
+                        <a:rPr lang="en-US" dirty="0" smtClean="0"/>
+                        <a:t>9. </a:t>
+                      </a:r>
+                      <a:endParaRPr lang="id-ID" dirty="0"/>
+                    </a:p>
+                  </a:txBody>
+                  <a:tcPr/>
+                </a:tc>
+                <a:tc>
+                  <a:txBody>
+                    <a:bodyPr/>
+                    <a:lstStyle/>
+                    <a:p>
+                      <a:r>
+                        <a:rPr lang="en-US" dirty="0" smtClean="0"/>
+                        <a:t>Read file</a:t>
+                      </a:r>
+                      <a:endParaRPr lang="id-ID" dirty="0"/>
+                    </a:p>
+                  </a:txBody>
+                  <a:tcPr/>
+                </a:tc>
+                <a:tc>
+                  <a:txBody>
+                    <a:bodyPr/>
+                    <a:lstStyle/>
+                    <a:p>
+                      <a:r>
+                        <a:rPr lang="en-US" dirty="0" err="1" smtClean="0"/>
+                        <a:t>Menampilkan</a:t>
+                      </a:r>
+                      <a:r>
+                        <a:rPr lang="en-US" baseline="0" dirty="0" smtClean="0"/>
+                        <a:t> </a:t>
+                      </a:r>
+                      <a:r>
+                        <a:rPr lang="en-US" baseline="0" dirty="0" err="1" smtClean="0"/>
+                        <a:t>isi</a:t>
+                      </a:r>
+                      <a:r>
+                        <a:rPr lang="en-US" baseline="0" dirty="0" smtClean="0"/>
+                        <a:t> </a:t>
+                      </a:r>
+                      <a:r>
+                        <a:rPr lang="en-US" baseline="0" dirty="0" err="1" smtClean="0"/>
+                        <a:t>suatu</a:t>
+                      </a:r>
+                      <a:r>
+                        <a:rPr lang="en-US" baseline="0" dirty="0" smtClean="0"/>
+                        <a:t> file</a:t>
+                      </a:r>
+                      <a:endParaRPr lang="id-ID" dirty="0"/>
+                    </a:p>
+                  </a:txBody>
+                  <a:tcPr/>
+                </a:tc>
+                <a:extLst>
+                  <a:ext uri="{0D108BD9-81ED-4DB2-BD59-A6C34878D82A}">
+                    <a16:rowId xmlns:a16="http://schemas.microsoft.com/office/drawing/2014/main" val="3978939952"/>
+                  </a:ext>
+                </a:extLst>
+              </a:tr>
             </a:tbl>
           </a:graphicData>
         </a:graphic>
@@ -4293,6 +5188,536 @@
     <p:extLst>
       <p:ext uri="{BB962C8B-B14F-4D97-AF65-F5344CB8AC3E}">
         <p14:creationId xmlns:p14="http://schemas.microsoft.com/office/powerpoint/2010/main" val="3851099919"/>
+      </p:ext>
+    </p:extLst>
+  </p:cSld>
+  <p:clrMapOvr>
+    <a:masterClrMapping/>
+  </p:clrMapOvr>
+</p:sld>
+</file>
+
+<file path=ppt/slides/slide4.xml><?xml version="1.0" encoding="utf-8"?>
+<p:sld xmlns:a="http://schemas.openxmlformats.org/drawingml/2006/main" xmlns:r="http://schemas.openxmlformats.org/officeDocument/2006/relationships" xmlns:p="http://schemas.openxmlformats.org/presentationml/2006/main">
+  <p:cSld>
+    <p:spTree>
+      <p:nvGrpSpPr>
+        <p:cNvPr id="1" name=""/>
+        <p:cNvGrpSpPr/>
+        <p:nvPr/>
+      </p:nvGrpSpPr>
+      <p:grpSpPr>
+        <a:xfrm>
+          <a:off x="0" y="0"/>
+          <a:ext cx="0" cy="0"/>
+          <a:chOff x="0" y="0"/>
+          <a:chExt cx="0" cy="0"/>
+        </a:xfrm>
+      </p:grpSpPr>
+      <p:sp>
+        <p:nvSpPr>
+          <p:cNvPr id="2" name="Title 1"/>
+          <p:cNvSpPr>
+            <a:spLocks noGrp="1"/>
+          </p:cNvSpPr>
+          <p:nvPr>
+            <p:ph type="title"/>
+          </p:nvPr>
+        </p:nvSpPr>
+        <p:spPr/>
+        <p:txBody>
+          <a:bodyPr/>
+          <a:lstStyle/>
+          <a:p>
+            <a:r>
+              <a:rPr lang="en-US" dirty="0" err="1" smtClean="0"/>
+              <a:t>Membuat</a:t>
+            </a:r>
+            <a:r>
+              <a:rPr lang="en-US" dirty="0" smtClean="0"/>
+              <a:t> </a:t>
+            </a:r>
+            <a:r>
+              <a:rPr lang="en-US" dirty="0" err="1" smtClean="0"/>
+              <a:t>direktori</a:t>
+            </a:r>
+            <a:endParaRPr lang="id-ID" dirty="0"/>
+          </a:p>
+        </p:txBody>
+      </p:sp>
+      <p:pic>
+        <p:nvPicPr>
+          <p:cNvPr id="4" name="Content Placeholder 3"/>
+          <p:cNvPicPr>
+            <a:picLocks noGrp="1" noChangeAspect="1"/>
+          </p:cNvPicPr>
+          <p:nvPr>
+            <p:ph idx="1"/>
+          </p:nvPr>
+        </p:nvPicPr>
+        <p:blipFill>
+          <a:blip r:embed="rId2"/>
+          <a:stretch>
+            <a:fillRect/>
+          </a:stretch>
+        </p:blipFill>
+        <p:spPr>
+          <a:xfrm>
+            <a:off x="3007284" y="1970041"/>
+            <a:ext cx="6238391" cy="3916409"/>
+          </a:xfrm>
+          <a:prstGeom prst="rect">
+            <a:avLst/>
+          </a:prstGeom>
+        </p:spPr>
+      </p:pic>
+    </p:spTree>
+    <p:extLst>
+      <p:ext uri="{BB962C8B-B14F-4D97-AF65-F5344CB8AC3E}">
+        <p14:creationId xmlns:p14="http://schemas.microsoft.com/office/powerpoint/2010/main" val="2881880918"/>
+      </p:ext>
+    </p:extLst>
+  </p:cSld>
+  <p:clrMapOvr>
+    <a:masterClrMapping/>
+  </p:clrMapOvr>
+</p:sld>
+</file>
+
+<file path=ppt/slides/slide5.xml><?xml version="1.0" encoding="utf-8"?>
+<p:sld xmlns:a="http://schemas.openxmlformats.org/drawingml/2006/main" xmlns:r="http://schemas.openxmlformats.org/officeDocument/2006/relationships" xmlns:p="http://schemas.openxmlformats.org/presentationml/2006/main">
+  <p:cSld>
+    <p:spTree>
+      <p:nvGrpSpPr>
+        <p:cNvPr id="1" name=""/>
+        <p:cNvGrpSpPr/>
+        <p:nvPr/>
+      </p:nvGrpSpPr>
+      <p:grpSpPr>
+        <a:xfrm>
+          <a:off x="0" y="0"/>
+          <a:ext cx="0" cy="0"/>
+          <a:chOff x="0" y="0"/>
+          <a:chExt cx="0" cy="0"/>
+        </a:xfrm>
+      </p:grpSpPr>
+      <p:sp>
+        <p:nvSpPr>
+          <p:cNvPr id="2" name="Title 1"/>
+          <p:cNvSpPr>
+            <a:spLocks noGrp="1"/>
+          </p:cNvSpPr>
+          <p:nvPr>
+            <p:ph type="title"/>
+          </p:nvPr>
+        </p:nvSpPr>
+        <p:spPr/>
+        <p:txBody>
+          <a:bodyPr/>
+          <a:lstStyle/>
+          <a:p>
+            <a:r>
+              <a:rPr lang="en-US" dirty="0" err="1" smtClean="0"/>
+              <a:t>Melihat</a:t>
+            </a:r>
+            <a:r>
+              <a:rPr lang="en-US" dirty="0" smtClean="0"/>
+              <a:t> </a:t>
+            </a:r>
+            <a:r>
+              <a:rPr lang="en-US" dirty="0" err="1" smtClean="0"/>
+              <a:t>direktori</a:t>
+            </a:r>
+            <a:r>
+              <a:rPr lang="en-US" dirty="0" smtClean="0"/>
+              <a:t> </a:t>
+            </a:r>
+            <a:r>
+              <a:rPr lang="en-US" dirty="0" err="1" smtClean="0"/>
+              <a:t>dan</a:t>
+            </a:r>
+            <a:r>
+              <a:rPr lang="en-US" dirty="0" smtClean="0"/>
+              <a:t> file</a:t>
+            </a:r>
+            <a:endParaRPr lang="id-ID" dirty="0"/>
+          </a:p>
+        </p:txBody>
+      </p:sp>
+      <p:pic>
+        <p:nvPicPr>
+          <p:cNvPr id="4" name="Content Placeholder 3"/>
+          <p:cNvPicPr>
+            <a:picLocks noGrp="1" noChangeAspect="1"/>
+          </p:cNvPicPr>
+          <p:nvPr>
+            <p:ph idx="1"/>
+          </p:nvPr>
+        </p:nvPicPr>
+        <p:blipFill>
+          <a:blip r:embed="rId2"/>
+          <a:stretch>
+            <a:fillRect/>
+          </a:stretch>
+        </p:blipFill>
+        <p:spPr>
+          <a:xfrm>
+            <a:off x="2839409" y="1963486"/>
+            <a:ext cx="6574142" cy="3861232"/>
+          </a:xfrm>
+          <a:prstGeom prst="rect">
+            <a:avLst/>
+          </a:prstGeom>
+        </p:spPr>
+      </p:pic>
+    </p:spTree>
+    <p:extLst>
+      <p:ext uri="{BB962C8B-B14F-4D97-AF65-F5344CB8AC3E}">
+        <p14:creationId xmlns:p14="http://schemas.microsoft.com/office/powerpoint/2010/main" val="1205410848"/>
+      </p:ext>
+    </p:extLst>
+  </p:cSld>
+  <p:clrMapOvr>
+    <a:masterClrMapping/>
+  </p:clrMapOvr>
+</p:sld>
+</file>
+
+<file path=ppt/slides/slide6.xml><?xml version="1.0" encoding="utf-8"?>
+<p:sld xmlns:a="http://schemas.openxmlformats.org/drawingml/2006/main" xmlns:r="http://schemas.openxmlformats.org/officeDocument/2006/relationships" xmlns:p="http://schemas.openxmlformats.org/presentationml/2006/main">
+  <p:cSld>
+    <p:spTree>
+      <p:nvGrpSpPr>
+        <p:cNvPr id="1" name=""/>
+        <p:cNvGrpSpPr/>
+        <p:nvPr/>
+      </p:nvGrpSpPr>
+      <p:grpSpPr>
+        <a:xfrm>
+          <a:off x="0" y="0"/>
+          <a:ext cx="0" cy="0"/>
+          <a:chOff x="0" y="0"/>
+          <a:chExt cx="0" cy="0"/>
+        </a:xfrm>
+      </p:grpSpPr>
+      <p:sp>
+        <p:nvSpPr>
+          <p:cNvPr id="2" name="Title 1"/>
+          <p:cNvSpPr>
+            <a:spLocks noGrp="1"/>
+          </p:cNvSpPr>
+          <p:nvPr>
+            <p:ph type="title"/>
+          </p:nvPr>
+        </p:nvSpPr>
+        <p:spPr/>
+        <p:txBody>
+          <a:bodyPr/>
+          <a:lstStyle/>
+          <a:p>
+            <a:r>
+              <a:rPr lang="en-US" dirty="0" smtClean="0"/>
+              <a:t>Download repository </a:t>
+            </a:r>
+            <a:r>
+              <a:rPr lang="en-US" dirty="0" err="1" smtClean="0"/>
+              <a:t>github</a:t>
+            </a:r>
+            <a:r>
+              <a:rPr lang="en-US" dirty="0" smtClean="0"/>
+              <a:t> </a:t>
+            </a:r>
+            <a:endParaRPr lang="id-ID" dirty="0"/>
+          </a:p>
+        </p:txBody>
+      </p:sp>
+      <p:pic>
+        <p:nvPicPr>
+          <p:cNvPr id="4" name="Content Placeholder 3"/>
+          <p:cNvPicPr>
+            <a:picLocks noGrp="1" noChangeAspect="1"/>
+          </p:cNvPicPr>
+          <p:nvPr>
+            <p:ph idx="1"/>
+          </p:nvPr>
+        </p:nvPicPr>
+        <p:blipFill>
+          <a:blip r:embed="rId2"/>
+          <a:stretch>
+            <a:fillRect/>
+          </a:stretch>
+        </p:blipFill>
+        <p:spPr>
+          <a:xfrm>
+            <a:off x="2668105" y="1942833"/>
+            <a:ext cx="6916115" cy="3829584"/>
+          </a:xfrm>
+          <a:prstGeom prst="rect">
+            <a:avLst/>
+          </a:prstGeom>
+        </p:spPr>
+      </p:pic>
+    </p:spTree>
+    <p:extLst>
+      <p:ext uri="{BB962C8B-B14F-4D97-AF65-F5344CB8AC3E}">
+        <p14:creationId xmlns:p14="http://schemas.microsoft.com/office/powerpoint/2010/main" val="266289010"/>
+      </p:ext>
+    </p:extLst>
+  </p:cSld>
+  <p:clrMapOvr>
+    <a:masterClrMapping/>
+  </p:clrMapOvr>
+</p:sld>
+</file>
+
+<file path=ppt/slides/slide7.xml><?xml version="1.0" encoding="utf-8"?>
+<p:sld xmlns:a="http://schemas.openxmlformats.org/drawingml/2006/main" xmlns:r="http://schemas.openxmlformats.org/officeDocument/2006/relationships" xmlns:p="http://schemas.openxmlformats.org/presentationml/2006/main">
+  <p:cSld>
+    <p:spTree>
+      <p:nvGrpSpPr>
+        <p:cNvPr id="1" name=""/>
+        <p:cNvGrpSpPr/>
+        <p:nvPr/>
+      </p:nvGrpSpPr>
+      <p:grpSpPr>
+        <a:xfrm>
+          <a:off x="0" y="0"/>
+          <a:ext cx="0" cy="0"/>
+          <a:chOff x="0" y="0"/>
+          <a:chExt cx="0" cy="0"/>
+        </a:xfrm>
+      </p:grpSpPr>
+      <p:sp>
+        <p:nvSpPr>
+          <p:cNvPr id="2" name="Title 1"/>
+          <p:cNvSpPr>
+            <a:spLocks noGrp="1"/>
+          </p:cNvSpPr>
+          <p:nvPr>
+            <p:ph type="title"/>
+          </p:nvPr>
+        </p:nvSpPr>
+        <p:spPr/>
+        <p:txBody>
+          <a:bodyPr/>
+          <a:lstStyle/>
+          <a:p>
+            <a:r>
+              <a:rPr lang="en-US" dirty="0" err="1" smtClean="0"/>
+              <a:t>Cek</a:t>
+            </a:r>
+            <a:r>
+              <a:rPr lang="en-US" dirty="0" smtClean="0"/>
+              <a:t> </a:t>
+            </a:r>
+            <a:r>
+              <a:rPr lang="en-US" dirty="0" err="1" smtClean="0"/>
+              <a:t>konektifitas</a:t>
+            </a:r>
+            <a:endParaRPr lang="id-ID" dirty="0"/>
+          </a:p>
+        </p:txBody>
+      </p:sp>
+      <p:pic>
+        <p:nvPicPr>
+          <p:cNvPr id="4" name="Content Placeholder 3"/>
+          <p:cNvPicPr>
+            <a:picLocks noGrp="1" noChangeAspect="1"/>
+          </p:cNvPicPr>
+          <p:nvPr>
+            <p:ph idx="1"/>
+          </p:nvPr>
+        </p:nvPicPr>
+        <p:blipFill>
+          <a:blip r:embed="rId2"/>
+          <a:stretch>
+            <a:fillRect/>
+          </a:stretch>
+        </p:blipFill>
+        <p:spPr>
+          <a:xfrm>
+            <a:off x="2210841" y="1985702"/>
+            <a:ext cx="7830643" cy="3743847"/>
+          </a:xfrm>
+          <a:prstGeom prst="rect">
+            <a:avLst/>
+          </a:prstGeom>
+        </p:spPr>
+      </p:pic>
+    </p:spTree>
+    <p:extLst>
+      <p:ext uri="{BB962C8B-B14F-4D97-AF65-F5344CB8AC3E}">
+        <p14:creationId xmlns:p14="http://schemas.microsoft.com/office/powerpoint/2010/main" val="3312058789"/>
+      </p:ext>
+    </p:extLst>
+  </p:cSld>
+  <p:clrMapOvr>
+    <a:masterClrMapping/>
+  </p:clrMapOvr>
+</p:sld>
+</file>
+
+<file path=ppt/slides/slide8.xml><?xml version="1.0" encoding="utf-8"?>
+<p:sld xmlns:a="http://schemas.openxmlformats.org/drawingml/2006/main" xmlns:r="http://schemas.openxmlformats.org/officeDocument/2006/relationships" xmlns:p="http://schemas.openxmlformats.org/presentationml/2006/main">
+  <p:cSld>
+    <p:spTree>
+      <p:nvGrpSpPr>
+        <p:cNvPr id="1" name=""/>
+        <p:cNvGrpSpPr/>
+        <p:nvPr/>
+      </p:nvGrpSpPr>
+      <p:grpSpPr>
+        <a:xfrm>
+          <a:off x="0" y="0"/>
+          <a:ext cx="0" cy="0"/>
+          <a:chOff x="0" y="0"/>
+          <a:chExt cx="0" cy="0"/>
+        </a:xfrm>
+      </p:grpSpPr>
+      <p:sp>
+        <p:nvSpPr>
+          <p:cNvPr id="2" name="Title 1"/>
+          <p:cNvSpPr>
+            <a:spLocks noGrp="1"/>
+          </p:cNvSpPr>
+          <p:nvPr>
+            <p:ph type="title"/>
+          </p:nvPr>
+        </p:nvSpPr>
+        <p:spPr/>
+        <p:txBody>
+          <a:bodyPr/>
+          <a:lstStyle/>
+          <a:p>
+            <a:r>
+              <a:rPr lang="en-US" dirty="0" err="1" smtClean="0"/>
+              <a:t>Hapus</a:t>
+            </a:r>
+            <a:r>
+              <a:rPr lang="en-US" dirty="0" smtClean="0"/>
+              <a:t> repository </a:t>
+            </a:r>
+            <a:r>
+              <a:rPr lang="en-US" dirty="0" err="1" smtClean="0"/>
+              <a:t>github</a:t>
+            </a:r>
+            <a:endParaRPr lang="id-ID" dirty="0"/>
+          </a:p>
+        </p:txBody>
+      </p:sp>
+      <p:pic>
+        <p:nvPicPr>
+          <p:cNvPr id="4" name="Content Placeholder 3"/>
+          <p:cNvPicPr>
+            <a:picLocks noGrp="1" noChangeAspect="1"/>
+          </p:cNvPicPr>
+          <p:nvPr>
+            <p:ph idx="1"/>
+          </p:nvPr>
+        </p:nvPicPr>
+        <p:blipFill>
+          <a:blip r:embed="rId2"/>
+          <a:stretch>
+            <a:fillRect/>
+          </a:stretch>
+        </p:blipFill>
+        <p:spPr>
+          <a:xfrm>
+            <a:off x="2833693" y="2081491"/>
+            <a:ext cx="6585573" cy="3786704"/>
+          </a:xfrm>
+          <a:prstGeom prst="rect">
+            <a:avLst/>
+          </a:prstGeom>
+        </p:spPr>
+      </p:pic>
+    </p:spTree>
+    <p:extLst>
+      <p:ext uri="{BB962C8B-B14F-4D97-AF65-F5344CB8AC3E}">
+        <p14:creationId xmlns:p14="http://schemas.microsoft.com/office/powerpoint/2010/main" val="3326957232"/>
+      </p:ext>
+    </p:extLst>
+  </p:cSld>
+  <p:clrMapOvr>
+    <a:masterClrMapping/>
+  </p:clrMapOvr>
+</p:sld>
+</file>
+
+<file path=ppt/slides/slide9.xml><?xml version="1.0" encoding="utf-8"?>
+<p:sld xmlns:a="http://schemas.openxmlformats.org/drawingml/2006/main" xmlns:r="http://schemas.openxmlformats.org/officeDocument/2006/relationships" xmlns:p="http://schemas.openxmlformats.org/presentationml/2006/main">
+  <p:cSld>
+    <p:spTree>
+      <p:nvGrpSpPr>
+        <p:cNvPr id="1" name=""/>
+        <p:cNvGrpSpPr/>
+        <p:nvPr/>
+      </p:nvGrpSpPr>
+      <p:grpSpPr>
+        <a:xfrm>
+          <a:off x="0" y="0"/>
+          <a:ext cx="0" cy="0"/>
+          <a:chOff x="0" y="0"/>
+          <a:chExt cx="0" cy="0"/>
+        </a:xfrm>
+      </p:grpSpPr>
+      <p:sp>
+        <p:nvSpPr>
+          <p:cNvPr id="2" name="Title 1"/>
+          <p:cNvSpPr>
+            <a:spLocks noGrp="1"/>
+          </p:cNvSpPr>
+          <p:nvPr>
+            <p:ph type="title"/>
+          </p:nvPr>
+        </p:nvSpPr>
+        <p:spPr/>
+        <p:txBody>
+          <a:bodyPr/>
+          <a:lstStyle/>
+          <a:p>
+            <a:r>
+              <a:rPr lang="en-US" dirty="0" err="1" smtClean="0"/>
+              <a:t>Hapus</a:t>
+            </a:r>
+            <a:r>
+              <a:rPr lang="en-US" dirty="0" smtClean="0"/>
+              <a:t> folder</a:t>
+            </a:r>
+            <a:endParaRPr lang="id-ID" dirty="0"/>
+          </a:p>
+        </p:txBody>
+      </p:sp>
+      <p:pic>
+        <p:nvPicPr>
+          <p:cNvPr id="4" name="Content Placeholder 3"/>
+          <p:cNvPicPr>
+            <a:picLocks noGrp="1" noChangeAspect="1"/>
+          </p:cNvPicPr>
+          <p:nvPr>
+            <p:ph idx="1"/>
+          </p:nvPr>
+        </p:nvPicPr>
+        <p:blipFill>
+          <a:blip r:embed="rId2"/>
+          <a:stretch>
+            <a:fillRect/>
+          </a:stretch>
+        </p:blipFill>
+        <p:spPr>
+          <a:xfrm>
+            <a:off x="3246631" y="1986369"/>
+            <a:ext cx="5759697" cy="3881197"/>
+          </a:xfrm>
+          <a:prstGeom prst="rect">
+            <a:avLst/>
+          </a:prstGeom>
+        </p:spPr>
+      </p:pic>
+    </p:spTree>
+    <p:extLst>
+      <p:ext uri="{BB962C8B-B14F-4D97-AF65-F5344CB8AC3E}">
+        <p14:creationId xmlns:p14="http://schemas.microsoft.com/office/powerpoint/2010/main" val="2661226100"/>
       </p:ext>
     </p:extLst>
   </p:cSld>

</xml_diff>